<commit_message>
updated correct server ip for applicaiton
</commit_message>
<xml_diff>
--- a/ColoradoCDO_AnalyticsChallenge_Final_Submission_Template.pptx
+++ b/ColoradoCDO_AnalyticsChallenge_Final_Submission_Template.pptx
@@ -13076,7 +13076,7 @@
           <p:cNvPr id="6" name="TextBox 5">
             <a:extLst>
               <a:ext uri="{FF2B5EF4-FFF2-40B4-BE49-F238E27FC236}">
-                <a16:creationId xmlns="" xmlns:a16="http://schemas.microsoft.com/office/drawing/2014/main" id="{D51CA420-9BE6-4719-9C86-6F59BED24418}"/>
+                <a16:creationId xmlns:a16="http://schemas.microsoft.com/office/drawing/2014/main" xmlns="" id="{D51CA420-9BE6-4719-9C86-6F59BED24418}"/>
               </a:ext>
             </a:extLst>
           </p:cNvPr>
@@ -13253,7 +13253,7 @@
           <p:cNvPr id="4" name="Google Shape;99;p15">
             <a:extLst>
               <a:ext uri="{FF2B5EF4-FFF2-40B4-BE49-F238E27FC236}">
-                <a16:creationId xmlns="" xmlns:a16="http://schemas.microsoft.com/office/drawing/2014/main" id="{56EAFF37-E88D-4E1F-8D66-6455CDF15726}"/>
+                <a16:creationId xmlns:a16="http://schemas.microsoft.com/office/drawing/2014/main" xmlns="" id="{56EAFF37-E88D-4E1F-8D66-6455CDF15726}"/>
               </a:ext>
             </a:extLst>
           </p:cNvPr>
@@ -13314,7 +13314,7 @@
           <p:cNvPr id="6" name="Oval 5">
             <a:extLst>
               <a:ext uri="{FF2B5EF4-FFF2-40B4-BE49-F238E27FC236}">
-                <a16:creationId xmlns="" xmlns:a16="http://schemas.microsoft.com/office/drawing/2014/main" id="{BC72E2AC-C96D-4FD9-8503-8CFA9236FCA2}"/>
+                <a16:creationId xmlns:a16="http://schemas.microsoft.com/office/drawing/2014/main" xmlns="" id="{BC72E2AC-C96D-4FD9-8503-8CFA9236FCA2}"/>
               </a:ext>
             </a:extLst>
           </p:cNvPr>
@@ -13363,7 +13363,7 @@
           <p:cNvPr id="7" name="Oval 6">
             <a:extLst>
               <a:ext uri="{FF2B5EF4-FFF2-40B4-BE49-F238E27FC236}">
-                <a16:creationId xmlns="" xmlns:a16="http://schemas.microsoft.com/office/drawing/2014/main" id="{B0AD21D6-9317-4E4E-BE18-F6B0F3790721}"/>
+                <a16:creationId xmlns:a16="http://schemas.microsoft.com/office/drawing/2014/main" xmlns="" id="{B0AD21D6-9317-4E4E-BE18-F6B0F3790721}"/>
               </a:ext>
             </a:extLst>
           </p:cNvPr>
@@ -13412,7 +13412,7 @@
           <p:cNvPr id="8" name="Oval 7">
             <a:extLst>
               <a:ext uri="{FF2B5EF4-FFF2-40B4-BE49-F238E27FC236}">
-                <a16:creationId xmlns="" xmlns:a16="http://schemas.microsoft.com/office/drawing/2014/main" id="{871A2738-038B-47FC-9776-BC0B962D7CBB}"/>
+                <a16:creationId xmlns:a16="http://schemas.microsoft.com/office/drawing/2014/main" xmlns="" id="{871A2738-038B-47FC-9776-BC0B962D7CBB}"/>
               </a:ext>
             </a:extLst>
           </p:cNvPr>
@@ -13461,7 +13461,7 @@
           <p:cNvPr id="10" name="Straight Arrow Connector 9">
             <a:extLst>
               <a:ext uri="{FF2B5EF4-FFF2-40B4-BE49-F238E27FC236}">
-                <a16:creationId xmlns="" xmlns:a16="http://schemas.microsoft.com/office/drawing/2014/main" id="{F03DBFED-DE56-4597-86F1-268A62CF50F2}"/>
+                <a16:creationId xmlns:a16="http://schemas.microsoft.com/office/drawing/2014/main" xmlns="" id="{F03DBFED-DE56-4597-86F1-268A62CF50F2}"/>
               </a:ext>
             </a:extLst>
           </p:cNvPr>
@@ -13506,7 +13506,7 @@
           <p:cNvPr id="14" name="Straight Arrow Connector 13">
             <a:extLst>
               <a:ext uri="{FF2B5EF4-FFF2-40B4-BE49-F238E27FC236}">
-                <a16:creationId xmlns="" xmlns:a16="http://schemas.microsoft.com/office/drawing/2014/main" id="{93D917B0-163E-4093-8362-249C4AC102AA}"/>
+                <a16:creationId xmlns:a16="http://schemas.microsoft.com/office/drawing/2014/main" xmlns="" id="{93D917B0-163E-4093-8362-249C4AC102AA}"/>
               </a:ext>
             </a:extLst>
           </p:cNvPr>
@@ -13548,7 +13548,7 @@
           <p:cNvPr id="16" name="Oval 15">
             <a:extLst>
               <a:ext uri="{FF2B5EF4-FFF2-40B4-BE49-F238E27FC236}">
-                <a16:creationId xmlns="" xmlns:a16="http://schemas.microsoft.com/office/drawing/2014/main" id="{53C969D2-C086-4192-AC7B-1C3FC66915A9}"/>
+                <a16:creationId xmlns:a16="http://schemas.microsoft.com/office/drawing/2014/main" xmlns="" id="{53C969D2-C086-4192-AC7B-1C3FC66915A9}"/>
               </a:ext>
             </a:extLst>
           </p:cNvPr>
@@ -13597,7 +13597,7 @@
           <p:cNvPr id="17" name="Oval 16">
             <a:extLst>
               <a:ext uri="{FF2B5EF4-FFF2-40B4-BE49-F238E27FC236}">
-                <a16:creationId xmlns="" xmlns:a16="http://schemas.microsoft.com/office/drawing/2014/main" id="{9513DA69-77F9-46B4-9FA7-E4D765AB7CDB}"/>
+                <a16:creationId xmlns:a16="http://schemas.microsoft.com/office/drawing/2014/main" xmlns="" id="{9513DA69-77F9-46B4-9FA7-E4D765AB7CDB}"/>
               </a:ext>
             </a:extLst>
           </p:cNvPr>
@@ -13646,7 +13646,7 @@
           <p:cNvPr id="18" name="Oval 17">
             <a:extLst>
               <a:ext uri="{FF2B5EF4-FFF2-40B4-BE49-F238E27FC236}">
-                <a16:creationId xmlns="" xmlns:a16="http://schemas.microsoft.com/office/drawing/2014/main" id="{F6287D7F-02D9-4099-9FE2-424FDFFF47B3}"/>
+                <a16:creationId xmlns:a16="http://schemas.microsoft.com/office/drawing/2014/main" xmlns="" id="{F6287D7F-02D9-4099-9FE2-424FDFFF47B3}"/>
               </a:ext>
             </a:extLst>
           </p:cNvPr>
@@ -13695,7 +13695,7 @@
           <p:cNvPr id="19" name="Oval 18">
             <a:extLst>
               <a:ext uri="{FF2B5EF4-FFF2-40B4-BE49-F238E27FC236}">
-                <a16:creationId xmlns="" xmlns:a16="http://schemas.microsoft.com/office/drawing/2014/main" id="{A68E4EFD-4DE9-4108-A7F1-AC01B89E71C2}"/>
+                <a16:creationId xmlns:a16="http://schemas.microsoft.com/office/drawing/2014/main" xmlns="" id="{A68E4EFD-4DE9-4108-A7F1-AC01B89E71C2}"/>
               </a:ext>
             </a:extLst>
           </p:cNvPr>
@@ -13744,7 +13744,7 @@
           <p:cNvPr id="21" name="Straight Arrow Connector 20">
             <a:extLst>
               <a:ext uri="{FF2B5EF4-FFF2-40B4-BE49-F238E27FC236}">
-                <a16:creationId xmlns="" xmlns:a16="http://schemas.microsoft.com/office/drawing/2014/main" id="{4E5A0D01-2A67-4047-B049-B0ADD750A4E4}"/>
+                <a16:creationId xmlns:a16="http://schemas.microsoft.com/office/drawing/2014/main" xmlns="" id="{4E5A0D01-2A67-4047-B049-B0ADD750A4E4}"/>
               </a:ext>
             </a:extLst>
           </p:cNvPr>
@@ -13789,7 +13789,7 @@
           <p:cNvPr id="23" name="Straight Arrow Connector 22">
             <a:extLst>
               <a:ext uri="{FF2B5EF4-FFF2-40B4-BE49-F238E27FC236}">
-                <a16:creationId xmlns="" xmlns:a16="http://schemas.microsoft.com/office/drawing/2014/main" id="{F0A13E12-CC53-4B4E-B79E-281FA33D0D74}"/>
+                <a16:creationId xmlns:a16="http://schemas.microsoft.com/office/drawing/2014/main" xmlns="" id="{F0A13E12-CC53-4B4E-B79E-281FA33D0D74}"/>
               </a:ext>
             </a:extLst>
           </p:cNvPr>
@@ -13834,7 +13834,7 @@
           <p:cNvPr id="25" name="Straight Arrow Connector 24">
             <a:extLst>
               <a:ext uri="{FF2B5EF4-FFF2-40B4-BE49-F238E27FC236}">
-                <a16:creationId xmlns="" xmlns:a16="http://schemas.microsoft.com/office/drawing/2014/main" id="{17D2EC6B-41EF-43F2-BE46-C2B0A796F8F2}"/>
+                <a16:creationId xmlns:a16="http://schemas.microsoft.com/office/drawing/2014/main" xmlns="" id="{17D2EC6B-41EF-43F2-BE46-C2B0A796F8F2}"/>
               </a:ext>
             </a:extLst>
           </p:cNvPr>
@@ -13879,7 +13879,7 @@
           <p:cNvPr id="27" name="Straight Arrow Connector 26">
             <a:extLst>
               <a:ext uri="{FF2B5EF4-FFF2-40B4-BE49-F238E27FC236}">
-                <a16:creationId xmlns="" xmlns:a16="http://schemas.microsoft.com/office/drawing/2014/main" id="{5D235A24-F052-491B-AE4B-71538D02DDC6}"/>
+                <a16:creationId xmlns:a16="http://schemas.microsoft.com/office/drawing/2014/main" xmlns="" id="{5D235A24-F052-491B-AE4B-71538D02DDC6}"/>
               </a:ext>
             </a:extLst>
           </p:cNvPr>
@@ -13924,7 +13924,7 @@
           <p:cNvPr id="29" name="Straight Arrow Connector 28">
             <a:extLst>
               <a:ext uri="{FF2B5EF4-FFF2-40B4-BE49-F238E27FC236}">
-                <a16:creationId xmlns="" xmlns:a16="http://schemas.microsoft.com/office/drawing/2014/main" id="{FD5D9A72-6B82-416A-949A-77626F501871}"/>
+                <a16:creationId xmlns:a16="http://schemas.microsoft.com/office/drawing/2014/main" xmlns="" id="{FD5D9A72-6B82-416A-949A-77626F501871}"/>
               </a:ext>
             </a:extLst>
           </p:cNvPr>
@@ -13969,7 +13969,7 @@
           <p:cNvPr id="31" name="Straight Arrow Connector 30">
             <a:extLst>
               <a:ext uri="{FF2B5EF4-FFF2-40B4-BE49-F238E27FC236}">
-                <a16:creationId xmlns="" xmlns:a16="http://schemas.microsoft.com/office/drawing/2014/main" id="{E274D33F-71D6-4BB9-BF46-9EBC2A77B7EF}"/>
+                <a16:creationId xmlns:a16="http://schemas.microsoft.com/office/drawing/2014/main" xmlns="" id="{E274D33F-71D6-4BB9-BF46-9EBC2A77B7EF}"/>
               </a:ext>
             </a:extLst>
           </p:cNvPr>
@@ -14014,7 +14014,7 @@
           <p:cNvPr id="33" name="Straight Arrow Connector 32">
             <a:extLst>
               <a:ext uri="{FF2B5EF4-FFF2-40B4-BE49-F238E27FC236}">
-                <a16:creationId xmlns="" xmlns:a16="http://schemas.microsoft.com/office/drawing/2014/main" id="{20263C82-C26F-4965-9105-066FE46072EF}"/>
+                <a16:creationId xmlns:a16="http://schemas.microsoft.com/office/drawing/2014/main" xmlns="" id="{20263C82-C26F-4965-9105-066FE46072EF}"/>
               </a:ext>
             </a:extLst>
           </p:cNvPr>
@@ -14059,7 +14059,7 @@
           <p:cNvPr id="35" name="Straight Arrow Connector 34">
             <a:extLst>
               <a:ext uri="{FF2B5EF4-FFF2-40B4-BE49-F238E27FC236}">
-                <a16:creationId xmlns="" xmlns:a16="http://schemas.microsoft.com/office/drawing/2014/main" id="{A62D04E5-750D-421B-9E53-05BCBB348B8C}"/>
+                <a16:creationId xmlns:a16="http://schemas.microsoft.com/office/drawing/2014/main" xmlns="" id="{A62D04E5-750D-421B-9E53-05BCBB348B8C}"/>
               </a:ext>
             </a:extLst>
           </p:cNvPr>
@@ -14104,7 +14104,7 @@
           <p:cNvPr id="37" name="Straight Arrow Connector 36">
             <a:extLst>
               <a:ext uri="{FF2B5EF4-FFF2-40B4-BE49-F238E27FC236}">
-                <a16:creationId xmlns="" xmlns:a16="http://schemas.microsoft.com/office/drawing/2014/main" id="{7CF47800-BE78-4D80-BA51-956DDA566304}"/>
+                <a16:creationId xmlns:a16="http://schemas.microsoft.com/office/drawing/2014/main" xmlns="" id="{7CF47800-BE78-4D80-BA51-956DDA566304}"/>
               </a:ext>
             </a:extLst>
           </p:cNvPr>
@@ -14149,7 +14149,7 @@
           <p:cNvPr id="39" name="Straight Arrow Connector 38">
             <a:extLst>
               <a:ext uri="{FF2B5EF4-FFF2-40B4-BE49-F238E27FC236}">
-                <a16:creationId xmlns="" xmlns:a16="http://schemas.microsoft.com/office/drawing/2014/main" id="{FA8E5632-3FD2-4E81-929F-B6E280077BE1}"/>
+                <a16:creationId xmlns:a16="http://schemas.microsoft.com/office/drawing/2014/main" xmlns="" id="{FA8E5632-3FD2-4E81-929F-B6E280077BE1}"/>
               </a:ext>
             </a:extLst>
           </p:cNvPr>
@@ -14194,7 +14194,7 @@
           <p:cNvPr id="41" name="Straight Arrow Connector 40">
             <a:extLst>
               <a:ext uri="{FF2B5EF4-FFF2-40B4-BE49-F238E27FC236}">
-                <a16:creationId xmlns="" xmlns:a16="http://schemas.microsoft.com/office/drawing/2014/main" id="{E2BC8F27-60D0-4453-811C-BFF24E0B3131}"/>
+                <a16:creationId xmlns:a16="http://schemas.microsoft.com/office/drawing/2014/main" xmlns="" id="{E2BC8F27-60D0-4453-811C-BFF24E0B3131}"/>
               </a:ext>
             </a:extLst>
           </p:cNvPr>
@@ -14239,7 +14239,7 @@
           <p:cNvPr id="43" name="Straight Arrow Connector 42">
             <a:extLst>
               <a:ext uri="{FF2B5EF4-FFF2-40B4-BE49-F238E27FC236}">
-                <a16:creationId xmlns="" xmlns:a16="http://schemas.microsoft.com/office/drawing/2014/main" id="{07243544-3A22-4279-BD7B-AE0C1B4B72A9}"/>
+                <a16:creationId xmlns:a16="http://schemas.microsoft.com/office/drawing/2014/main" xmlns="" id="{07243544-3A22-4279-BD7B-AE0C1B4B72A9}"/>
               </a:ext>
             </a:extLst>
           </p:cNvPr>
@@ -14284,7 +14284,7 @@
           <p:cNvPr id="44" name="TextBox 43">
             <a:extLst>
               <a:ext uri="{FF2B5EF4-FFF2-40B4-BE49-F238E27FC236}">
-                <a16:creationId xmlns="" xmlns:a16="http://schemas.microsoft.com/office/drawing/2014/main" id="{01448908-005C-473F-9FE4-9FB800695E82}"/>
+                <a16:creationId xmlns:a16="http://schemas.microsoft.com/office/drawing/2014/main" xmlns="" id="{01448908-005C-473F-9FE4-9FB800695E82}"/>
               </a:ext>
             </a:extLst>
           </p:cNvPr>
@@ -14563,7 +14563,7 @@
           <p:cNvPr id="2" name="TextBox 1">
             <a:extLst>
               <a:ext uri="{FF2B5EF4-FFF2-40B4-BE49-F238E27FC236}">
-                <a16:creationId xmlns="" xmlns:a16="http://schemas.microsoft.com/office/drawing/2014/main" id="{3ACC8C19-8434-4A63-AD71-F9621F9D11AA}"/>
+                <a16:creationId xmlns:a16="http://schemas.microsoft.com/office/drawing/2014/main" xmlns="" id="{3ACC8C19-8434-4A63-AD71-F9621F9D11AA}"/>
               </a:ext>
             </a:extLst>
           </p:cNvPr>
@@ -14850,7 +14850,7 @@
           <p:cNvPr id="2" name="TextBox 1">
             <a:extLst>
               <a:ext uri="{FF2B5EF4-FFF2-40B4-BE49-F238E27FC236}">
-                <a16:creationId xmlns="" xmlns:a16="http://schemas.microsoft.com/office/drawing/2014/main" id="{289C28B9-5D65-457A-86B6-7B001E2432E9}"/>
+                <a16:creationId xmlns:a16="http://schemas.microsoft.com/office/drawing/2014/main" xmlns="" id="{289C28B9-5D65-457A-86B6-7B001E2432E9}"/>
               </a:ext>
             </a:extLst>
           </p:cNvPr>
@@ -14894,7 +14894,7 @@
           <p:cNvPr id="7" name="Rectangle 6">
             <a:extLst>
               <a:ext uri="{FF2B5EF4-FFF2-40B4-BE49-F238E27FC236}">
-                <a16:creationId xmlns="" xmlns:a16="http://schemas.microsoft.com/office/drawing/2014/main" id="{E766130E-3030-4198-BDE7-BB8EBE0AA046}"/>
+                <a16:creationId xmlns:a16="http://schemas.microsoft.com/office/drawing/2014/main" xmlns="" id="{E766130E-3030-4198-BDE7-BB8EBE0AA046}"/>
               </a:ext>
             </a:extLst>
           </p:cNvPr>
@@ -15255,7 +15255,7 @@
           <p:cNvPr id="2" name="TextBox 1">
             <a:extLst>
               <a:ext uri="{FF2B5EF4-FFF2-40B4-BE49-F238E27FC236}">
-                <a16:creationId xmlns="" xmlns:a16="http://schemas.microsoft.com/office/drawing/2014/main" id="{748473EE-B197-44AF-8ECE-30FA8560CA62}"/>
+                <a16:creationId xmlns:a16="http://schemas.microsoft.com/office/drawing/2014/main" xmlns="" id="{748473EE-B197-44AF-8ECE-30FA8560CA62}"/>
               </a:ext>
             </a:extLst>
           </p:cNvPr>
@@ -15449,7 +15449,7 @@
           <p:cNvPr id="2" name="TextBox 1">
             <a:extLst>
               <a:ext uri="{FF2B5EF4-FFF2-40B4-BE49-F238E27FC236}">
-                <a16:creationId xmlns="" xmlns:a16="http://schemas.microsoft.com/office/drawing/2014/main" id="{C7911A60-D8E3-4A14-A756-B79450A39D25}"/>
+                <a16:creationId xmlns:a16="http://schemas.microsoft.com/office/drawing/2014/main" xmlns="" id="{C7911A60-D8E3-4A14-A756-B79450A39D25}"/>
               </a:ext>
             </a:extLst>
           </p:cNvPr>
@@ -15704,7 +15704,7 @@
           <p:cNvPr id="2" name="TextBox 1">
             <a:extLst>
               <a:ext uri="{FF2B5EF4-FFF2-40B4-BE49-F238E27FC236}">
-                <a16:creationId xmlns="" xmlns:a16="http://schemas.microsoft.com/office/drawing/2014/main" id="{8D810404-2980-4620-869E-ACA5240C59E6}"/>
+                <a16:creationId xmlns:a16="http://schemas.microsoft.com/office/drawing/2014/main" xmlns="" id="{8D810404-2980-4620-869E-ACA5240C59E6}"/>
               </a:ext>
             </a:extLst>
           </p:cNvPr>
@@ -15714,7 +15714,7 @@
         <p:spPr>
           <a:xfrm>
             <a:off x="1051034" y="1702676"/>
-            <a:ext cx="9743090" cy="2677656"/>
+            <a:ext cx="9743090" cy="2246769"/>
           </a:xfrm>
           <a:prstGeom prst="rect">
             <a:avLst/>
@@ -15767,16 +15767,38 @@
                 <a:solidFill>
                   <a:schemeClr val="bg1"/>
                 </a:solidFill>
-                <a:hlinkClick r:id="rId4"/>
+                <a:hlinkClick r:id="rId4" invalidUrl="http://:7474/browser/"/>
               </a:rPr>
-              <a:t>http://34.214.149.148:7474/browser</a:t>
+              <a:t>http</a:t>
             </a:r>
             <a:r>
               <a:rPr lang="en-US" dirty="0" smtClean="0">
                 <a:solidFill>
                   <a:schemeClr val="bg1"/>
                 </a:solidFill>
-                <a:hlinkClick r:id="rId4"/>
+                <a:hlinkClick r:id="rId5" invalidUrl="http://:7474/browser/"/>
+              </a:rPr>
+              <a:t>://</a:t>
+            </a:r>
+            <a:r>
+              <a:rPr lang="en-US" dirty="0"/>
+              <a:t>52.13.126.147</a:t>
+            </a:r>
+            <a:r>
+              <a:rPr lang="en-US" dirty="0" smtClean="0">
+                <a:solidFill>
+                  <a:schemeClr val="bg1"/>
+                </a:solidFill>
+                <a:hlinkClick r:id="rId6" invalidUrl="http://:7474/browser/"/>
+              </a:rPr>
+              <a:t>:7474/browser</a:t>
+            </a:r>
+            <a:r>
+              <a:rPr lang="en-US" dirty="0" smtClean="0">
+                <a:solidFill>
+                  <a:schemeClr val="bg1"/>
+                </a:solidFill>
+                <a:hlinkClick r:id="rId7" invalidUrl="http://:7474/browser/"/>
               </a:rPr>
               <a:t>/</a:t>
             </a:r>
@@ -15831,45 +15853,24 @@
           </a:p>
           <a:p>
             <a:r>
-              <a:rPr lang="en-US" dirty="0">
-                <a:hlinkClick r:id="rId5"/>
+              <a:rPr lang="en-US" dirty="0" smtClean="0">
+                <a:hlinkClick r:id="rId8"/>
               </a:rPr>
-              <a:t>http://54.201.4.75:5000</a:t>
+              <a:t>http://</a:t>
+            </a:r>
+            <a:r>
+              <a:rPr lang="en-US" dirty="0"/>
+              <a:t>52.13.126.147</a:t>
             </a:r>
             <a:r>
               <a:rPr lang="en-US" dirty="0" smtClean="0">
-                <a:hlinkClick r:id="rId5"/>
+                <a:hlinkClick r:id="rId8"/>
               </a:rPr>
-              <a:t>/</a:t>
-            </a:r>
-            <a:endParaRPr lang="en-US" dirty="0" smtClean="0"/>
-          </a:p>
-          <a:p>
-            <a:r>
-              <a:rPr lang="en-US" dirty="0" smtClean="0">
-                <a:solidFill>
-                  <a:schemeClr val="bg1"/>
-                </a:solidFill>
-              </a:rPr>
-              <a:t>Or </a:t>
-            </a:r>
-          </a:p>
-          <a:p>
-            <a:r>
-              <a:rPr lang="en-US" dirty="0">
-                <a:hlinkClick r:id="rId6"/>
-              </a:rPr>
-              <a:t>http</a:t>
-            </a:r>
-            <a:r>
-              <a:rPr lang="en-US" dirty="0" smtClean="0">
-                <a:hlinkClick r:id="rId6"/>
-              </a:rPr>
-              <a:t>://34.214.149.148:5000</a:t>
+              <a:t>:5000</a:t>
             </a:r>
             <a:r>
               <a:rPr lang="en-US" dirty="0">
-                <a:hlinkClick r:id="rId6"/>
+                <a:hlinkClick r:id="rId8"/>
               </a:rPr>
               <a:t>/</a:t>
             </a:r>

</xml_diff>